<commit_message>
[#OMG] Improve API documentation, prepare next iteration
</commit_message>
<xml_diff>
--- a/docs/OMG API4KP Revised Submission 20210201.pptx
+++ b/docs/OMG API4KP Revised Submission 20210201.pptx
@@ -3887,12 +3887,8 @@
               <a:t>Revised Submission ad/</a:t>
             </a:r>
             <a:r>
-              <a:rPr lang="en-US" b="1" dirty="0">
-                <a:solidFill>
-                  <a:srgbClr val="FF0000"/>
-                </a:solidFill>
-              </a:rPr>
-              <a:t>TODO</a:t>
+              <a:rPr lang="en-US" dirty="0"/>
+              <a:t>/2021-03-01</a:t>
             </a:r>
             <a:br>
               <a:rPr lang="en-GB" dirty="0"/>
@@ -5831,7 +5827,7 @@
           <a:graphicData uri="http://schemas.openxmlformats.org/presentationml/2006/ole">
             <mc:AlternateContent xmlns:mc="http://schemas.openxmlformats.org/markup-compatibility/2006">
               <mc:Choice xmlns:v="urn:schemas-microsoft-com:vml" Requires="v">
-                <p:oleObj spid="_x0000_s1044" name="Document" r:id="rId3" imgW="6352129" imgH="2416445" progId="Word.Document.12">
+                <p:oleObj spid="_x0000_s1047" name="Document" r:id="rId3" imgW="6352129" imgH="2416445" progId="Word.Document.12">
                   <p:embed/>
                 </p:oleObj>
               </mc:Choice>

</xml_diff>